<commit_message>
update outline and ppt
</commit_message>
<xml_diff>
--- a/materials/slides/ch11-how-does-shell-run-a-command.pptx
+++ b/materials/slides/ch11-how-does-shell-run-a-command.pptx
@@ -204,7 +204,7 @@
           <a:p>
             <a:fld id="{F43B6EE9-BDC9-469F-844A-ED2A9895708F}" type="datetimeFigureOut">
               <a:rPr lang="zh-CN" altLang="en-US" smtClean="0"/>
-              <a:t>2018/2/25</a:t>
+              <a:t>2018/2/27</a:t>
             </a:fld>
             <a:endParaRPr lang="zh-CN" altLang="en-US"/>
           </a:p>
@@ -710,7 +710,7 @@
           <a:p>
             <a:fld id="{02E60DA2-A0BC-48C9-AA88-75C78721B420}" type="datetimeFigureOut">
               <a:rPr lang="zh-CN" altLang="en-US" smtClean="0"/>
-              <a:t>2018/2/25</a:t>
+              <a:t>2018/2/27</a:t>
             </a:fld>
             <a:endParaRPr lang="zh-CN" altLang="en-US"/>
           </a:p>
@@ -932,7 +932,7 @@
           <a:p>
             <a:fld id="{02E60DA2-A0BC-48C9-AA88-75C78721B420}" type="datetimeFigureOut">
               <a:rPr lang="zh-CN" altLang="en-US" smtClean="0"/>
-              <a:t>2018/2/25</a:t>
+              <a:t>2018/2/27</a:t>
             </a:fld>
             <a:endParaRPr lang="zh-CN" altLang="en-US"/>
           </a:p>
@@ -1164,7 +1164,7 @@
           <a:p>
             <a:fld id="{02E60DA2-A0BC-48C9-AA88-75C78721B420}" type="datetimeFigureOut">
               <a:rPr lang="zh-CN" altLang="en-US" smtClean="0"/>
-              <a:t>2018/2/25</a:t>
+              <a:t>2018/2/27</a:t>
             </a:fld>
             <a:endParaRPr lang="zh-CN" altLang="en-US"/>
           </a:p>
@@ -1414,7 +1414,7 @@
           <a:p>
             <a:fld id="{02E60DA2-A0BC-48C9-AA88-75C78721B420}" type="datetimeFigureOut">
               <a:rPr lang="zh-CN" altLang="en-US" smtClean="0"/>
-              <a:t>2018/2/25</a:t>
+              <a:t>2018/2/27</a:t>
             </a:fld>
             <a:endParaRPr lang="zh-CN" altLang="en-US"/>
           </a:p>
@@ -1652,7 +1652,7 @@
           <a:p>
             <a:fld id="{02E60DA2-A0BC-48C9-AA88-75C78721B420}" type="datetimeFigureOut">
               <a:rPr lang="zh-CN" altLang="en-US" smtClean="0"/>
-              <a:t>2018/2/25</a:t>
+              <a:t>2018/2/27</a:t>
             </a:fld>
             <a:endParaRPr lang="zh-CN" altLang="en-US"/>
           </a:p>
@@ -1957,7 +1957,7 @@
           <a:p>
             <a:fld id="{02E60DA2-A0BC-48C9-AA88-75C78721B420}" type="datetimeFigureOut">
               <a:rPr lang="zh-CN" altLang="en-US" smtClean="0"/>
-              <a:t>2018/2/25</a:t>
+              <a:t>2018/2/27</a:t>
             </a:fld>
             <a:endParaRPr lang="zh-CN" altLang="en-US"/>
           </a:p>
@@ -2260,7 +2260,7 @@
           <a:p>
             <a:fld id="{02E60DA2-A0BC-48C9-AA88-75C78721B420}" type="datetimeFigureOut">
               <a:rPr lang="zh-CN" altLang="en-US" smtClean="0"/>
-              <a:t>2018/2/25</a:t>
+              <a:t>2018/2/27</a:t>
             </a:fld>
             <a:endParaRPr lang="zh-CN" altLang="en-US"/>
           </a:p>
@@ -2711,7 +2711,7 @@
           <a:p>
             <a:fld id="{02E60DA2-A0BC-48C9-AA88-75C78721B420}" type="datetimeFigureOut">
               <a:rPr lang="zh-CN" altLang="en-US" smtClean="0"/>
-              <a:t>2018/2/25</a:t>
+              <a:t>2018/2/27</a:t>
             </a:fld>
             <a:endParaRPr lang="zh-CN" altLang="en-US"/>
           </a:p>
@@ -2884,7 +2884,7 @@
           <a:p>
             <a:fld id="{02E60DA2-A0BC-48C9-AA88-75C78721B420}" type="datetimeFigureOut">
               <a:rPr lang="zh-CN" altLang="en-US" smtClean="0"/>
-              <a:t>2018/2/25</a:t>
+              <a:t>2018/2/27</a:t>
             </a:fld>
             <a:endParaRPr lang="zh-CN" altLang="en-US"/>
           </a:p>
@@ -3021,7 +3021,7 @@
           <a:p>
             <a:fld id="{02E60DA2-A0BC-48C9-AA88-75C78721B420}" type="datetimeFigureOut">
               <a:rPr lang="zh-CN" altLang="en-US" smtClean="0"/>
-              <a:t>2018/2/25</a:t>
+              <a:t>2018/2/27</a:t>
             </a:fld>
             <a:endParaRPr lang="zh-CN" altLang="en-US"/>
           </a:p>
@@ -3365,7 +3365,7 @@
           <a:p>
             <a:fld id="{02E60DA2-A0BC-48C9-AA88-75C78721B420}" type="datetimeFigureOut">
               <a:rPr lang="zh-CN" altLang="en-US" smtClean="0"/>
-              <a:t>2018/2/25</a:t>
+              <a:t>2018/2/27</a:t>
             </a:fld>
             <a:endParaRPr lang="zh-CN" altLang="en-US"/>
           </a:p>
@@ -3587,7 +3587,7 @@
           <a:p>
             <a:fld id="{02E60DA2-A0BC-48C9-AA88-75C78721B420}" type="datetimeFigureOut">
               <a:rPr lang="zh-CN" altLang="en-US" smtClean="0"/>
-              <a:t>2018/2/25</a:t>
+              <a:t>2018/2/27</a:t>
             </a:fld>
             <a:endParaRPr lang="zh-CN" altLang="en-US"/>
           </a:p>
@@ -3908,7 +3908,7 @@
           <a:p>
             <a:fld id="{02E60DA2-A0BC-48C9-AA88-75C78721B420}" type="datetimeFigureOut">
               <a:rPr lang="zh-CN" altLang="en-US" smtClean="0"/>
-              <a:t>2018/2/25</a:t>
+              <a:t>2018/2/27</a:t>
             </a:fld>
             <a:endParaRPr lang="zh-CN" altLang="en-US"/>
           </a:p>
@@ -4146,7 +4146,7 @@
           <a:p>
             <a:fld id="{02E60DA2-A0BC-48C9-AA88-75C78721B420}" type="datetimeFigureOut">
               <a:rPr lang="zh-CN" altLang="en-US" smtClean="0"/>
-              <a:t>2018/2/25</a:t>
+              <a:t>2018/2/27</a:t>
             </a:fld>
             <a:endParaRPr lang="zh-CN" altLang="en-US"/>
           </a:p>
@@ -4384,7 +4384,7 @@
           <a:p>
             <a:fld id="{02E60DA2-A0BC-48C9-AA88-75C78721B420}" type="datetimeFigureOut">
               <a:rPr lang="zh-CN" altLang="en-US" smtClean="0"/>
-              <a:t>2018/2/25</a:t>
+              <a:t>2018/2/27</a:t>
             </a:fld>
             <a:endParaRPr lang="zh-CN" altLang="en-US"/>
           </a:p>
@@ -4683,7 +4683,7 @@
           <a:p>
             <a:fld id="{02E60DA2-A0BC-48C9-AA88-75C78721B420}" type="datetimeFigureOut">
               <a:rPr lang="zh-CN" altLang="en-US" smtClean="0"/>
-              <a:t>2018/2/25</a:t>
+              <a:t>2018/2/27</a:t>
             </a:fld>
             <a:endParaRPr lang="zh-CN" altLang="en-US"/>
           </a:p>
@@ -4972,7 +4972,7 @@
           <a:p>
             <a:fld id="{02E60DA2-A0BC-48C9-AA88-75C78721B420}" type="datetimeFigureOut">
               <a:rPr lang="zh-CN" altLang="en-US" smtClean="0"/>
-              <a:t>2018/2/25</a:t>
+              <a:t>2018/2/27</a:t>
             </a:fld>
             <a:endParaRPr lang="zh-CN" altLang="en-US"/>
           </a:p>
@@ -5408,7 +5408,7 @@
           <a:p>
             <a:fld id="{02E60DA2-A0BC-48C9-AA88-75C78721B420}" type="datetimeFigureOut">
               <a:rPr lang="zh-CN" altLang="en-US" smtClean="0"/>
-              <a:t>2018/2/25</a:t>
+              <a:t>2018/2/27</a:t>
             </a:fld>
             <a:endParaRPr lang="zh-CN" altLang="en-US"/>
           </a:p>
@@ -5573,7 +5573,7 @@
           <a:p>
             <a:fld id="{02E60DA2-A0BC-48C9-AA88-75C78721B420}" type="datetimeFigureOut">
               <a:rPr lang="zh-CN" altLang="en-US" smtClean="0"/>
-              <a:t>2018/2/25</a:t>
+              <a:t>2018/2/27</a:t>
             </a:fld>
             <a:endParaRPr lang="zh-CN" altLang="en-US"/>
           </a:p>
@@ -5710,7 +5710,7 @@
           <a:p>
             <a:fld id="{02E60DA2-A0BC-48C9-AA88-75C78721B420}" type="datetimeFigureOut">
               <a:rPr lang="zh-CN" altLang="en-US" smtClean="0"/>
-              <a:t>2018/2/25</a:t>
+              <a:t>2018/2/27</a:t>
             </a:fld>
             <a:endParaRPr lang="zh-CN" altLang="en-US"/>
           </a:p>
@@ -6045,7 +6045,7 @@
           <a:p>
             <a:fld id="{02E60DA2-A0BC-48C9-AA88-75C78721B420}" type="datetimeFigureOut">
               <a:rPr lang="zh-CN" altLang="en-US" smtClean="0"/>
-              <a:t>2018/2/25</a:t>
+              <a:t>2018/2/27</a:t>
             </a:fld>
             <a:endParaRPr lang="zh-CN" altLang="en-US"/>
           </a:p>
@@ -6357,7 +6357,7 @@
           <a:p>
             <a:fld id="{02E60DA2-A0BC-48C9-AA88-75C78721B420}" type="datetimeFigureOut">
               <a:rPr lang="zh-CN" altLang="en-US" smtClean="0"/>
-              <a:t>2018/2/25</a:t>
+              <a:t>2018/2/27</a:t>
             </a:fld>
             <a:endParaRPr lang="zh-CN" altLang="en-US"/>
           </a:p>
@@ -7504,14 +7504,14 @@
           <a:lstStyle/>
           <a:p>
             <a:r>
-              <a:rPr lang="zh-CN" altLang="en-US" sz="3600" dirty="0">
+              <a:rPr lang="zh-CN" altLang="en-US" sz="3600">
                 <a:solidFill>
                   <a:schemeClr val="tx2">
                     <a:lumMod val="50000"/>
                   </a:schemeClr>
                 </a:solidFill>
               </a:rPr>
-              <a:t>第十二讲 </a:t>
+              <a:t>第十一讲 </a:t>
             </a:r>
             <a:r>
               <a:rPr lang="en-US" altLang="zh-CN" sz="3600" dirty="0">
@@ -7869,64 +7869,84 @@
           <a:lstStyle/>
           <a:p>
             <a:r>
-              <a:rPr lang="zh-CN" altLang="en-US" sz="2400" dirty="0"/>
+              <a:rPr lang="zh-CN" altLang="en-US" sz="2000" dirty="0"/>
               <a:t>当前</a:t>
             </a:r>
             <a:r>
-              <a:rPr lang="en-US" altLang="zh-CN" sz="2400" dirty="0"/>
+              <a:rPr lang="en-US" altLang="zh-CN" sz="2000" dirty="0"/>
               <a:t>shell</a:t>
             </a:r>
             <a:r>
-              <a:rPr lang="zh-CN" altLang="en-US" sz="2400" dirty="0"/>
+              <a:rPr lang="zh-CN" altLang="en-US" sz="2000" dirty="0"/>
               <a:t>运行时保存的信息，包括终端类型，当前目录，主目录，语言编码，默认命令搜索路径等信息。</a:t>
             </a:r>
-            <a:endParaRPr lang="en-US" altLang="zh-CN" sz="2400" dirty="0"/>
-          </a:p>
-          <a:p>
-            <a:r>
-              <a:rPr lang="zh-CN" altLang="en-US" sz="2400" dirty="0"/>
+            <a:endParaRPr lang="en-US" altLang="zh-CN" sz="2000" dirty="0"/>
+          </a:p>
+          <a:p>
+            <a:endParaRPr lang="en-US" altLang="zh-CN" sz="2000" dirty="0"/>
+          </a:p>
+          <a:p>
+            <a:r>
+              <a:rPr lang="zh-CN" altLang="en-US" sz="2000" dirty="0"/>
               <a:t>运行</a:t>
             </a:r>
             <a:r>
-              <a:rPr lang="en-US" altLang="zh-CN" sz="2400" dirty="0" err="1"/>
+              <a:rPr lang="en-US" altLang="zh-CN" sz="2000" dirty="0" err="1"/>
               <a:t>env</a:t>
             </a:r>
             <a:r>
-              <a:rPr lang="zh-CN" altLang="en-US" sz="2400" dirty="0"/>
+              <a:rPr lang="zh-CN" altLang="en-US" sz="2000" dirty="0"/>
               <a:t>命令可以查看当前环境变量。</a:t>
             </a:r>
-            <a:endParaRPr lang="en-US" altLang="zh-CN" sz="2400" dirty="0"/>
-          </a:p>
-          <a:p>
-            <a:r>
-              <a:rPr lang="zh-CN" altLang="en-US" sz="2400" dirty="0"/>
+            <a:endParaRPr lang="en-US" altLang="zh-CN" sz="2000" dirty="0"/>
+          </a:p>
+          <a:p>
+            <a:endParaRPr lang="en-US" altLang="zh-CN" sz="2000" dirty="0"/>
+          </a:p>
+          <a:p>
+            <a:r>
+              <a:rPr lang="zh-CN" altLang="en-US" sz="2000" dirty="0"/>
               <a:t>环境变量是一个名称和值的对应列表。一种是</a:t>
             </a:r>
             <a:r>
-              <a:rPr lang="en-US" altLang="zh-CN" sz="2400" dirty="0"/>
+              <a:rPr lang="en-US" altLang="zh-CN" sz="2000" dirty="0"/>
               <a:t>shell</a:t>
             </a:r>
             <a:r>
-              <a:rPr lang="zh-CN" altLang="en-US" sz="2400" dirty="0"/>
+              <a:rPr lang="zh-CN" altLang="en-US" sz="2000" dirty="0"/>
               <a:t>启动时解析配置文件生成，还有一种临时的环境变量是在</a:t>
             </a:r>
             <a:r>
-              <a:rPr lang="en-US" altLang="zh-CN" sz="2400" dirty="0"/>
+              <a:rPr lang="en-US" altLang="zh-CN" sz="2000" dirty="0"/>
               <a:t>shell</a:t>
             </a:r>
             <a:r>
-              <a:rPr lang="zh-CN" altLang="en-US" sz="2400" dirty="0"/>
+              <a:rPr lang="zh-CN" altLang="en-US" sz="2000" dirty="0"/>
               <a:t>中使用</a:t>
             </a:r>
             <a:r>
-              <a:rPr lang="en-US" altLang="zh-CN" sz="2400" dirty="0"/>
+              <a:rPr lang="en-US" altLang="zh-CN" sz="2000" dirty="0"/>
               <a:t>export</a:t>
             </a:r>
             <a:r>
-              <a:rPr lang="zh-CN" altLang="en-US" sz="2400" dirty="0"/>
+              <a:rPr lang="zh-CN" altLang="en-US" sz="2000" dirty="0"/>
               <a:t>生成。</a:t>
             </a:r>
-            <a:endParaRPr lang="en-US" altLang="zh-CN" sz="2400" dirty="0"/>
+            <a:endParaRPr lang="en-US" altLang="zh-CN" sz="2000" dirty="0"/>
+          </a:p>
+          <a:p>
+            <a:endParaRPr lang="en-US" altLang="zh-CN" sz="2000" dirty="0"/>
+          </a:p>
+          <a:p>
+            <a:r>
+              <a:rPr lang="en-US" altLang="zh-CN" sz="2000" dirty="0"/>
+              <a:t>PATH</a:t>
+            </a:r>
+            <a:r>
+              <a:rPr lang="zh-CN" altLang="en-US" sz="2000" dirty="0"/>
+              <a:t>变量记录了要查找命令的路径顺序。</a:t>
+            </a:r>
+            <a:endParaRPr lang="en-US" altLang="zh-CN" sz="2000" dirty="0"/>
           </a:p>
         </p:txBody>
       </p:sp>
@@ -8018,163 +8038,168 @@
           <a:lstStyle/>
           <a:p>
             <a:r>
-              <a:rPr lang="zh-CN" altLang="en-US" sz="2400" dirty="0"/>
+              <a:rPr lang="zh-CN" altLang="en-US" sz="2000" dirty="0"/>
               <a:t>输入一条命令并确认后，实际</a:t>
             </a:r>
             <a:r>
-              <a:rPr lang="en-US" altLang="zh-CN" sz="2400" dirty="0"/>
+              <a:rPr lang="en-US" altLang="zh-CN" sz="2000" dirty="0"/>
               <a:t>shell</a:t>
             </a:r>
             <a:r>
-              <a:rPr lang="zh-CN" altLang="en-US" sz="2400" dirty="0"/>
+              <a:rPr lang="zh-CN" altLang="en-US" sz="2000" dirty="0"/>
               <a:t>获取的是一行字符串，</a:t>
             </a:r>
             <a:r>
-              <a:rPr lang="en-US" altLang="zh-CN" sz="2400" dirty="0"/>
+              <a:rPr lang="en-US" altLang="zh-CN" sz="2000" dirty="0"/>
               <a:t>shell</a:t>
             </a:r>
             <a:r>
-              <a:rPr lang="zh-CN" altLang="en-US" sz="2400" dirty="0"/>
+              <a:rPr lang="zh-CN" altLang="en-US" sz="2000" dirty="0"/>
               <a:t>要对字符串进行解析，并确定命令名称，参数等信息。</a:t>
             </a:r>
-            <a:endParaRPr lang="en-US" altLang="zh-CN" sz="2400" dirty="0"/>
-          </a:p>
-          <a:p>
-            <a:r>
-              <a:rPr lang="zh-CN" altLang="en-US" sz="2400" dirty="0"/>
+            <a:endParaRPr lang="en-US" altLang="zh-CN" sz="2000" dirty="0"/>
+          </a:p>
+          <a:p>
+            <a:endParaRPr lang="en-US" altLang="zh-CN" sz="2000" dirty="0"/>
+          </a:p>
+          <a:p>
+            <a:r>
+              <a:rPr lang="zh-CN" altLang="en-US" sz="2000" dirty="0"/>
               <a:t>然后，</a:t>
             </a:r>
             <a:r>
-              <a:rPr lang="en-US" altLang="zh-CN" sz="2400" dirty="0"/>
+              <a:rPr lang="en-US" altLang="zh-CN" sz="2000" dirty="0"/>
               <a:t>shell</a:t>
             </a:r>
             <a:r>
-              <a:rPr lang="zh-CN" altLang="en-US" sz="2400" dirty="0"/>
+              <a:rPr lang="zh-CN" altLang="en-US" sz="2000" dirty="0"/>
               <a:t>要根据配置文件的搜索路径，从每个路径寻找命令，没有找到则提示错误信息，找到就调用</a:t>
             </a:r>
             <a:r>
-              <a:rPr lang="en-US" altLang="zh-CN" sz="2400" dirty="0"/>
+              <a:rPr lang="en-US" altLang="zh-CN" sz="2000" dirty="0"/>
               <a:t>Linux</a:t>
             </a:r>
             <a:r>
-              <a:rPr lang="zh-CN" altLang="en-US" sz="2400" dirty="0"/>
+              <a:rPr lang="zh-CN" altLang="en-US" sz="2000" dirty="0"/>
               <a:t>提供的系统调用运行命令。</a:t>
             </a:r>
-            <a:endParaRPr lang="en-US" altLang="zh-CN" sz="2400" dirty="0"/>
-          </a:p>
-          <a:p>
-            <a:r>
-              <a:rPr lang="zh-CN" altLang="en-US" sz="2400" dirty="0"/>
+            <a:endParaRPr lang="en-US" altLang="zh-CN" sz="2000" dirty="0"/>
+          </a:p>
+          <a:p>
+            <a:endParaRPr lang="en-US" altLang="zh-CN" sz="2000" dirty="0"/>
+          </a:p>
+          <a:p>
+            <a:r>
+              <a:rPr lang="zh-CN" altLang="en-US" sz="2000" dirty="0"/>
               <a:t>比如：输入 </a:t>
             </a:r>
             <a:r>
-              <a:rPr lang="en-US" altLang="zh-CN" sz="2400" dirty="0"/>
+              <a:rPr lang="en-US" altLang="zh-CN" sz="2000" dirty="0"/>
               <a:t>ls  -l,  shell</a:t>
             </a:r>
             <a:r>
-              <a:rPr lang="zh-CN" altLang="en-US" sz="2400" dirty="0"/>
+              <a:rPr lang="zh-CN" altLang="en-US" sz="2000" dirty="0"/>
               <a:t>要解析成‘</a:t>
             </a:r>
             <a:r>
-              <a:rPr lang="en-US" altLang="zh-CN" sz="2400" dirty="0"/>
+              <a:rPr lang="en-US" altLang="zh-CN" sz="2000" dirty="0"/>
               <a:t>ls</a:t>
             </a:r>
             <a:r>
-              <a:rPr lang="zh-CN" altLang="en-US" sz="2400" dirty="0"/>
+              <a:rPr lang="zh-CN" altLang="en-US" sz="2000" dirty="0"/>
               <a:t>’ </a:t>
             </a:r>
             <a:r>
-              <a:rPr lang="en-US" altLang="zh-CN" sz="2400" dirty="0"/>
+              <a:rPr lang="en-US" altLang="zh-CN" sz="2000" dirty="0"/>
               <a:t>, ‘-l’ </a:t>
             </a:r>
             <a:r>
-              <a:rPr lang="zh-CN" altLang="en-US" sz="2400" dirty="0"/>
+              <a:rPr lang="zh-CN" altLang="en-US" sz="2000" dirty="0"/>
               <a:t>，</a:t>
             </a:r>
             <a:r>
-              <a:rPr lang="en-US" altLang="zh-CN" sz="2400" dirty="0"/>
+              <a:rPr lang="en-US" altLang="zh-CN" sz="2000" dirty="0"/>
               <a:t>’ls’</a:t>
             </a:r>
             <a:r>
-              <a:rPr lang="zh-CN" altLang="en-US" sz="2400" dirty="0"/>
+              <a:rPr lang="zh-CN" altLang="en-US" sz="2000" dirty="0"/>
               <a:t>就是命令名称，并在</a:t>
             </a:r>
             <a:r>
-              <a:rPr lang="en-US" altLang="zh-CN" sz="2400" dirty="0"/>
+              <a:rPr lang="en-US" altLang="zh-CN" sz="2000" dirty="0"/>
               <a:t>PATH</a:t>
             </a:r>
             <a:r>
-              <a:rPr lang="zh-CN" altLang="en-US" sz="2400" dirty="0"/>
+              <a:rPr lang="zh-CN" altLang="en-US" sz="2000" dirty="0"/>
               <a:t>设置的路径中寻找，找到</a:t>
             </a:r>
             <a:r>
-              <a:rPr lang="en-US" altLang="zh-CN" sz="2400" dirty="0"/>
+              <a:rPr lang="en-US" altLang="zh-CN" sz="2000" dirty="0"/>
               <a:t>/bin/ls</a:t>
             </a:r>
             <a:r>
-              <a:rPr lang="zh-CN" altLang="en-US" sz="2400" dirty="0"/>
+              <a:rPr lang="zh-CN" altLang="en-US" sz="2000" dirty="0"/>
               <a:t>这个命令，</a:t>
             </a:r>
             <a:r>
-              <a:rPr lang="en-US" altLang="zh-CN" sz="2400" dirty="0"/>
+              <a:rPr lang="en-US" altLang="zh-CN" sz="2000" dirty="0"/>
               <a:t>fork</a:t>
             </a:r>
             <a:r>
-              <a:rPr lang="zh-CN" altLang="en-US" sz="2400" dirty="0"/>
+              <a:rPr lang="zh-CN" altLang="en-US" sz="2000" dirty="0"/>
               <a:t>一个子进程调用</a:t>
             </a:r>
             <a:r>
-              <a:rPr lang="en-US" altLang="zh-CN" sz="2400" dirty="0" err="1"/>
+              <a:rPr lang="en-US" altLang="zh-CN" sz="2000" dirty="0" err="1"/>
               <a:t>execv</a:t>
             </a:r>
             <a:r>
-              <a:rPr lang="zh-CN" altLang="en-US" sz="2400" dirty="0"/>
+              <a:rPr lang="zh-CN" altLang="en-US" sz="2000" dirty="0"/>
               <a:t>等系统调用传递参数运行命令。并等待结束。</a:t>
             </a:r>
-            <a:endParaRPr lang="en-US" altLang="zh-CN" sz="2400" dirty="0"/>
-          </a:p>
-          <a:p>
-            <a:r>
-              <a:rPr lang="zh-CN" altLang="en-US" sz="2400" dirty="0"/>
+            <a:endParaRPr lang="en-US" altLang="zh-CN" sz="2000" dirty="0"/>
+          </a:p>
+          <a:p>
+            <a:endParaRPr lang="en-US" altLang="zh-CN" sz="2000" dirty="0"/>
+          </a:p>
+          <a:p>
+            <a:r>
+              <a:rPr lang="zh-CN" altLang="en-US" sz="2000" dirty="0"/>
               <a:t>注意：真正运行命令的不是</a:t>
             </a:r>
             <a:r>
-              <a:rPr lang="en-US" altLang="zh-CN" sz="2400" dirty="0"/>
+              <a:rPr lang="en-US" altLang="zh-CN" sz="2000" dirty="0"/>
               <a:t>shell</a:t>
             </a:r>
             <a:r>
-              <a:rPr lang="zh-CN" altLang="en-US" sz="2400" dirty="0"/>
+              <a:rPr lang="zh-CN" altLang="en-US" sz="2000" dirty="0"/>
               <a:t>，而是内核，</a:t>
             </a:r>
             <a:r>
-              <a:rPr lang="en-US" altLang="zh-CN" sz="2400" dirty="0"/>
+              <a:rPr lang="en-US" altLang="zh-CN" sz="2000" dirty="0"/>
               <a:t>shell</a:t>
             </a:r>
             <a:r>
-              <a:rPr lang="zh-CN" altLang="en-US" sz="2400" dirty="0"/>
+              <a:rPr lang="zh-CN" altLang="en-US" sz="2000" dirty="0"/>
               <a:t>去调用内核提供的接口，</a:t>
             </a:r>
             <a:r>
-              <a:rPr lang="en-US" altLang="zh-CN" sz="2400" dirty="0"/>
+              <a:rPr lang="en-US" altLang="zh-CN" sz="2000" dirty="0"/>
               <a:t>shell</a:t>
             </a:r>
             <a:r>
-              <a:rPr lang="zh-CN" altLang="en-US" sz="2400" dirty="0"/>
+              <a:rPr lang="zh-CN" altLang="en-US" sz="2000" dirty="0"/>
               <a:t>是调用</a:t>
             </a:r>
             <a:r>
-              <a:rPr lang="en-US" altLang="zh-CN" sz="2400" dirty="0"/>
+              <a:rPr lang="en-US" altLang="zh-CN" sz="2000" dirty="0"/>
               <a:t>fork</a:t>
             </a:r>
             <a:r>
-              <a:rPr lang="zh-CN" altLang="en-US" sz="2400" dirty="0"/>
-              <a:t>创建子进程去</a:t>
-            </a:r>
-            <a:r>
-              <a:rPr lang="zh-CN" altLang="en-US" sz="2400"/>
-              <a:t>运行命令，而所有的进程都是系统内核调度的。</a:t>
-            </a:r>
-            <a:endParaRPr lang="en-US" altLang="zh-CN" sz="2400" dirty="0"/>
+              <a:rPr lang="zh-CN" altLang="en-US" sz="2000" dirty="0"/>
+              <a:t>创建子进程去运行命令，而所有的进程都是系统内核调度的。</a:t>
+            </a:r>
+            <a:endParaRPr lang="en-US" altLang="zh-CN" sz="2000" dirty="0"/>
           </a:p>
           <a:p>
             <a:endParaRPr lang="en-US" altLang="zh-CN" sz="2400" dirty="0"/>
@@ -8268,95 +8293,104 @@
           <a:lstStyle/>
           <a:p>
             <a:r>
-              <a:rPr lang="en-US" altLang="zh-CN" sz="2400" dirty="0"/>
+              <a:rPr lang="en-US" altLang="zh-CN" sz="2000" dirty="0"/>
               <a:t>shell</a:t>
             </a:r>
             <a:r>
-              <a:rPr lang="zh-CN" altLang="en-US" sz="2400" dirty="0"/>
+              <a:rPr lang="zh-CN" altLang="en-US" sz="2000" dirty="0"/>
               <a:t>支持通配符，使用*表示匹配任意长度的字符，</a:t>
             </a:r>
             <a:r>
-              <a:rPr lang="en-US" altLang="zh-CN" sz="2400" dirty="0"/>
+              <a:rPr lang="en-US" altLang="zh-CN" sz="2000" dirty="0"/>
               <a:t>?</a:t>
             </a:r>
             <a:r>
-              <a:rPr lang="zh-CN" altLang="en-US" sz="2400"/>
+              <a:rPr lang="zh-CN" altLang="en-US" sz="2000" dirty="0"/>
               <a:t>匹配任意一个字符。</a:t>
             </a:r>
-            <a:endParaRPr lang="en-US" altLang="zh-CN" sz="2400" dirty="0"/>
-          </a:p>
-          <a:p>
-            <a:r>
-              <a:rPr lang="en-US" altLang="zh-CN" sz="2400" dirty="0"/>
+            <a:endParaRPr lang="en-US" altLang="zh-CN" sz="2000" dirty="0"/>
+          </a:p>
+          <a:p>
+            <a:endParaRPr lang="en-US" altLang="zh-CN" sz="2000" dirty="0"/>
+          </a:p>
+          <a:p>
+            <a:r>
+              <a:rPr lang="en-US" altLang="zh-CN" sz="2000" dirty="0"/>
               <a:t>shell</a:t>
             </a:r>
             <a:r>
-              <a:rPr lang="zh-CN" altLang="en-US" sz="2400" dirty="0"/>
+              <a:rPr lang="zh-CN" altLang="en-US" sz="2000" dirty="0"/>
               <a:t>在遇到通配符会进行扩展，比如输入</a:t>
             </a:r>
             <a:r>
-              <a:rPr lang="en-US" altLang="zh-CN" sz="2400" dirty="0"/>
+              <a:rPr lang="en-US" altLang="zh-CN" sz="2000" dirty="0"/>
               <a:t>ls  ./a*</a:t>
             </a:r>
             <a:r>
-              <a:rPr lang="zh-CN" altLang="en-US" sz="2400" dirty="0"/>
+              <a:rPr lang="zh-CN" altLang="en-US" sz="2000" dirty="0"/>
               <a:t>，会匹配</a:t>
             </a:r>
             <a:r>
-              <a:rPr lang="en-US" altLang="zh-CN" sz="2400" dirty="0"/>
+              <a:rPr lang="en-US" altLang="zh-CN" sz="2000" dirty="0"/>
               <a:t>a</a:t>
             </a:r>
             <a:r>
-              <a:rPr lang="zh-CN" altLang="en-US" sz="2400" dirty="0"/>
+              <a:rPr lang="zh-CN" altLang="en-US" sz="2000" dirty="0"/>
               <a:t>开头的所有文件并显示，如果存在</a:t>
             </a:r>
             <a:r>
-              <a:rPr lang="en-US" altLang="zh-CN" sz="2400" dirty="0"/>
+              <a:rPr lang="en-US" altLang="zh-CN" sz="2000" dirty="0"/>
               <a:t>ab.txt</a:t>
             </a:r>
             <a:r>
-              <a:rPr lang="zh-CN" altLang="en-US" sz="2400" dirty="0"/>
+              <a:rPr lang="zh-CN" altLang="en-US" sz="2000" dirty="0"/>
               <a:t>，</a:t>
             </a:r>
             <a:r>
-              <a:rPr lang="en-US" altLang="zh-CN" sz="2400" dirty="0"/>
+              <a:rPr lang="en-US" altLang="zh-CN" sz="2000" dirty="0"/>
               <a:t>ac.txt</a:t>
             </a:r>
             <a:r>
-              <a:rPr lang="zh-CN" altLang="en-US" sz="2400" dirty="0"/>
+              <a:rPr lang="zh-CN" altLang="en-US" sz="2000" dirty="0"/>
               <a:t>，则会扩展成</a:t>
             </a:r>
             <a:r>
-              <a:rPr lang="en-US" altLang="zh-CN" sz="2400" dirty="0"/>
+              <a:rPr lang="en-US" altLang="zh-CN" sz="2000" dirty="0"/>
               <a:t>ls  ./ab.txt  ./ac.txt</a:t>
             </a:r>
             <a:r>
-              <a:rPr lang="zh-CN" altLang="en-US" sz="2400" dirty="0"/>
+              <a:rPr lang="zh-CN" altLang="en-US" sz="2000" dirty="0"/>
               <a:t>。</a:t>
             </a:r>
-            <a:endParaRPr lang="en-US" altLang="zh-CN" sz="2400" dirty="0"/>
-          </a:p>
-          <a:p>
-            <a:r>
-              <a:rPr lang="zh-CN" altLang="en-US" sz="2400" dirty="0"/>
+            <a:endParaRPr lang="en-US" altLang="zh-CN" sz="2000" dirty="0"/>
+          </a:p>
+          <a:p>
+            <a:endParaRPr lang="en-US" altLang="zh-CN" sz="2000" dirty="0"/>
+          </a:p>
+          <a:p>
+            <a:r>
+              <a:rPr lang="zh-CN" altLang="en-US" sz="2000" dirty="0"/>
               <a:t>注意：扩展通配符的是</a:t>
             </a:r>
             <a:r>
-              <a:rPr lang="en-US" altLang="zh-CN" sz="2400" dirty="0"/>
+              <a:rPr lang="en-US" altLang="zh-CN" sz="2000" dirty="0"/>
               <a:t>shell</a:t>
             </a:r>
             <a:r>
-              <a:rPr lang="zh-CN" altLang="en-US" sz="2400" dirty="0"/>
-              <a:t>，不是命令自身，如果是命令本身实现的，那就每个命令都要实现，这重工作量是不可想象的。</a:t>
-            </a:r>
-            <a:endParaRPr lang="en-US" altLang="zh-CN" sz="2400" dirty="0"/>
-          </a:p>
-          <a:p>
-            <a:r>
-              <a:rPr lang="zh-CN" altLang="en-US" sz="2400" dirty="0"/>
+              <a:rPr lang="zh-CN" altLang="en-US" sz="2000" dirty="0"/>
+              <a:t>，不是命令自身，如果是命令本身实现的，那就每个命令都要实现。</a:t>
+            </a:r>
+            <a:endParaRPr lang="en-US" altLang="zh-CN" sz="2000" dirty="0"/>
+          </a:p>
+          <a:p>
+            <a:endParaRPr lang="en-US" altLang="zh-CN" sz="2000" dirty="0"/>
+          </a:p>
+          <a:p>
+            <a:r>
+              <a:rPr lang="zh-CN" altLang="en-US" sz="2000" dirty="0"/>
               <a:t>通配符在使用时会带来很多便利，但是有些特殊情况也要注意。</a:t>
             </a:r>
-            <a:endParaRPr lang="en-US" altLang="zh-CN" sz="2400" dirty="0"/>
+            <a:endParaRPr lang="en-US" altLang="zh-CN" sz="2000" dirty="0"/>
           </a:p>
           <a:p>
             <a:endParaRPr lang="en-US" altLang="zh-CN" sz="2000" dirty="0"/>
@@ -8445,89 +8479,92 @@
           <a:lstStyle/>
           <a:p>
             <a:r>
-              <a:rPr lang="zh-CN" altLang="en-US" sz="2400" dirty="0"/>
+              <a:rPr lang="zh-CN" altLang="en-US" sz="2000" dirty="0"/>
               <a:t>如果在当前目录存在一个</a:t>
             </a:r>
             <a:r>
-              <a:rPr lang="en-US" altLang="zh-CN" sz="2400" dirty="0"/>
+              <a:rPr lang="en-US" altLang="zh-CN" sz="2000" dirty="0"/>
               <a:t>-l</a:t>
             </a:r>
             <a:r>
-              <a:rPr lang="zh-CN" altLang="en-US" sz="2400" dirty="0"/>
+              <a:rPr lang="zh-CN" altLang="en-US" sz="2000" dirty="0"/>
               <a:t>文件，这时候</a:t>
             </a:r>
             <a:r>
-              <a:rPr lang="en-US" altLang="zh-CN" sz="2400" dirty="0"/>
+              <a:rPr lang="en-US" altLang="zh-CN" sz="2000" dirty="0"/>
               <a:t>ls  * </a:t>
             </a:r>
             <a:r>
-              <a:rPr lang="zh-CN" altLang="en-US" sz="2400" dirty="0"/>
+              <a:rPr lang="zh-CN" altLang="en-US" sz="2000" dirty="0"/>
               <a:t>显示格式是加入了</a:t>
             </a:r>
             <a:r>
-              <a:rPr lang="en-US" altLang="zh-CN" sz="2400" dirty="0"/>
+              <a:rPr lang="en-US" altLang="zh-CN" sz="2000" dirty="0"/>
               <a:t>-l</a:t>
             </a:r>
             <a:r>
-              <a:rPr lang="zh-CN" altLang="en-US" sz="2400" dirty="0"/>
+              <a:rPr lang="zh-CN" altLang="en-US" sz="2000" dirty="0"/>
               <a:t>参数的形式，但是没有</a:t>
             </a:r>
             <a:r>
-              <a:rPr lang="en-US" altLang="zh-CN" sz="2400" dirty="0"/>
+              <a:rPr lang="en-US" altLang="zh-CN" sz="2000" dirty="0"/>
               <a:t>-l</a:t>
             </a:r>
             <a:r>
-              <a:rPr lang="zh-CN" altLang="en-US" sz="2400" dirty="0"/>
+              <a:rPr lang="zh-CN" altLang="en-US" sz="2000" dirty="0"/>
               <a:t>文件，原因就在于</a:t>
             </a:r>
             <a:r>
-              <a:rPr lang="en-US" altLang="zh-CN" sz="2400" dirty="0"/>
+              <a:rPr lang="en-US" altLang="zh-CN" sz="2000" dirty="0"/>
               <a:t>shell</a:t>
             </a:r>
             <a:r>
-              <a:rPr lang="zh-CN" altLang="en-US" sz="2400" dirty="0"/>
+              <a:rPr lang="zh-CN" altLang="en-US" sz="2000" dirty="0"/>
               <a:t>扩展通配符以后，</a:t>
             </a:r>
             <a:r>
-              <a:rPr lang="en-US" altLang="zh-CN" sz="2400" dirty="0"/>
+              <a:rPr lang="en-US" altLang="zh-CN" sz="2000" dirty="0"/>
               <a:t>-l</a:t>
             </a:r>
             <a:r>
-              <a:rPr lang="zh-CN" altLang="en-US" sz="2400" dirty="0"/>
+              <a:rPr lang="zh-CN" altLang="en-US" sz="2000" dirty="0"/>
               <a:t>会被作为</a:t>
             </a:r>
             <a:r>
-              <a:rPr lang="en-US" altLang="zh-CN" sz="2400" dirty="0"/>
+              <a:rPr lang="en-US" altLang="zh-CN" sz="2000" dirty="0"/>
               <a:t>ls</a:t>
             </a:r>
             <a:r>
-              <a:rPr lang="zh-CN" altLang="en-US" sz="2400" dirty="0"/>
+              <a:rPr lang="zh-CN" altLang="en-US" sz="2000" dirty="0"/>
               <a:t>的参数，而不是文件名。</a:t>
             </a:r>
-            <a:endParaRPr lang="en-US" altLang="zh-CN" sz="2400" dirty="0"/>
-          </a:p>
-          <a:p>
-            <a:r>
-              <a:rPr lang="zh-CN" altLang="en-US" sz="2400" dirty="0"/>
+            <a:endParaRPr lang="en-US" altLang="zh-CN" sz="2000" dirty="0"/>
+          </a:p>
+          <a:p>
+            <a:endParaRPr lang="en-US" altLang="zh-CN" sz="2000" dirty="0"/>
+          </a:p>
+          <a:p>
+            <a:r>
+              <a:rPr lang="zh-CN" altLang="en-US" sz="2000" dirty="0"/>
               <a:t>但是</a:t>
             </a:r>
             <a:r>
-              <a:rPr lang="en-US" altLang="zh-CN" sz="2400" dirty="0"/>
+              <a:rPr lang="en-US" altLang="zh-CN" sz="2000" dirty="0"/>
               <a:t>ls   ./* </a:t>
             </a:r>
             <a:r>
-              <a:rPr lang="zh-CN" altLang="en-US" sz="2400" dirty="0"/>
+              <a:rPr lang="zh-CN" altLang="en-US" sz="2000" dirty="0"/>
               <a:t>则不会有问题，因为</a:t>
             </a:r>
             <a:r>
-              <a:rPr lang="en-US" altLang="zh-CN" sz="2400" dirty="0"/>
+              <a:rPr lang="en-US" altLang="zh-CN" sz="2000" dirty="0"/>
               <a:t>./-l</a:t>
             </a:r>
             <a:r>
-              <a:rPr lang="zh-CN" altLang="en-US" sz="2400" dirty="0"/>
+              <a:rPr lang="zh-CN" altLang="en-US" sz="2000" dirty="0"/>
               <a:t>不会被认为是参数。</a:t>
             </a:r>
-            <a:endParaRPr lang="en-US" altLang="zh-CN" sz="2400" dirty="0"/>
+            <a:endParaRPr lang="en-US" altLang="zh-CN" sz="2000" dirty="0"/>
           </a:p>
         </p:txBody>
       </p:sp>
@@ -8583,9 +8620,10 @@
           <a:lstStyle/>
           <a:p>
             <a:r>
-              <a:rPr lang="zh-CN" altLang="en-US" dirty="0"/>
-              <a:t>命令替换</a:t>
-            </a:r>
+              <a:rPr lang="zh-CN" altLang="en-US"/>
+              <a:t>命令别名</a:t>
+            </a:r>
+            <a:endParaRPr lang="zh-CN" altLang="en-US" dirty="0"/>
           </a:p>
         </p:txBody>
       </p:sp>
@@ -8613,94 +8651,97 @@
           <a:lstStyle/>
           <a:p>
             <a:r>
-              <a:rPr lang="zh-CN" altLang="en-US" sz="2400" dirty="0"/>
+              <a:rPr lang="zh-CN" altLang="en-US" sz="2000" dirty="0"/>
               <a:t>其他常用替换：</a:t>
             </a:r>
             <a:r>
-              <a:rPr lang="en-US" altLang="zh-CN" sz="2400" dirty="0"/>
+              <a:rPr lang="en-US" altLang="zh-CN" sz="2000" dirty="0"/>
               <a:t>bash</a:t>
             </a:r>
             <a:r>
-              <a:rPr lang="zh-CN" altLang="en-US" sz="2400" dirty="0"/>
+              <a:rPr lang="zh-CN" altLang="en-US" sz="2000" dirty="0"/>
               <a:t>中，</a:t>
             </a:r>
             <a:r>
-              <a:rPr lang="en-US" altLang="zh-CN" sz="2400" dirty="0"/>
+              <a:rPr lang="en-US" altLang="zh-CN" sz="2000" dirty="0"/>
               <a:t>~</a:t>
             </a:r>
             <a:r>
-              <a:rPr lang="zh-CN" altLang="en-US" sz="2400" dirty="0"/>
+              <a:rPr lang="zh-CN" altLang="en-US" sz="2000" dirty="0"/>
               <a:t>表示用户主目录。</a:t>
             </a:r>
             <a:r>
-              <a:rPr lang="en-US" altLang="zh-CN" sz="2400" dirty="0"/>
+              <a:rPr lang="en-US" altLang="zh-CN" sz="2000" dirty="0"/>
               <a:t>echo ~</a:t>
             </a:r>
             <a:r>
-              <a:rPr lang="zh-CN" altLang="en-US" sz="2400" dirty="0"/>
+              <a:rPr lang="zh-CN" altLang="en-US" sz="2000" dirty="0"/>
               <a:t>输出的是用户主目录。</a:t>
             </a:r>
-            <a:endParaRPr lang="en-US" altLang="zh-CN" sz="2400" dirty="0"/>
-          </a:p>
-          <a:p>
-            <a:endParaRPr lang="en-US" altLang="zh-CN" sz="2400" dirty="0"/>
-          </a:p>
-          <a:p>
-            <a:r>
-              <a:rPr lang="en-US" altLang="zh-CN" sz="2400" dirty="0"/>
+            <a:endParaRPr lang="en-US" altLang="zh-CN" sz="2000" dirty="0"/>
+          </a:p>
+          <a:p>
+            <a:endParaRPr lang="en-US" altLang="zh-CN" sz="2000" dirty="0"/>
+          </a:p>
+          <a:p>
+            <a:r>
+              <a:rPr lang="en-US" altLang="zh-CN" sz="2000" dirty="0"/>
               <a:t>.</a:t>
             </a:r>
             <a:r>
-              <a:rPr lang="en-US" altLang="zh-CN" sz="2400" dirty="0" err="1"/>
+              <a:rPr lang="en-US" altLang="zh-CN" sz="2000" dirty="0" err="1"/>
               <a:t>bashrc</a:t>
             </a:r>
             <a:r>
-              <a:rPr lang="zh-CN" altLang="en-US" sz="2400" dirty="0"/>
+              <a:rPr lang="zh-CN" altLang="en-US" sz="2000" dirty="0"/>
               <a:t>中通过</a:t>
             </a:r>
             <a:r>
-              <a:rPr lang="en-US" altLang="zh-CN" sz="2400" dirty="0"/>
+              <a:rPr lang="en-US" altLang="zh-CN" sz="2000" dirty="0"/>
               <a:t>alias</a:t>
             </a:r>
             <a:r>
-              <a:rPr lang="zh-CN" altLang="en-US" sz="2400" dirty="0"/>
+              <a:rPr lang="zh-CN" altLang="en-US" sz="2000" dirty="0"/>
               <a:t>可以为命令取别名：</a:t>
             </a:r>
             <a:r>
-              <a:rPr lang="en-US" altLang="zh-CN" sz="2400" dirty="0"/>
+              <a:rPr lang="en-US" altLang="zh-CN" sz="2000" dirty="0"/>
               <a:t>alias  c=‘clear’</a:t>
             </a:r>
           </a:p>
           <a:p>
-            <a:r>
-              <a:rPr lang="zh-CN" altLang="en-US" sz="2400" dirty="0"/>
+            <a:endParaRPr lang="en-US" altLang="zh-CN" sz="2000" dirty="0"/>
+          </a:p>
+          <a:p>
+            <a:r>
+              <a:rPr lang="zh-CN" altLang="en-US" sz="2000" dirty="0"/>
               <a:t>这样</a:t>
             </a:r>
             <a:r>
-              <a:rPr lang="en-US" altLang="zh-CN" sz="2400" dirty="0"/>
+              <a:rPr lang="en-US" altLang="zh-CN" sz="2000" dirty="0"/>
               <a:t>bash</a:t>
             </a:r>
             <a:r>
-              <a:rPr lang="zh-CN" altLang="en-US" sz="2400" dirty="0"/>
+              <a:rPr lang="zh-CN" altLang="en-US" sz="2000" dirty="0"/>
               <a:t>运行后输入</a:t>
             </a:r>
             <a:r>
-              <a:rPr lang="en-US" altLang="zh-CN" sz="2400" dirty="0"/>
+              <a:rPr lang="en-US" altLang="zh-CN" sz="2000" dirty="0"/>
               <a:t>c</a:t>
             </a:r>
             <a:r>
-              <a:rPr lang="zh-CN" altLang="en-US" sz="2400" dirty="0"/>
+              <a:rPr lang="zh-CN" altLang="en-US" sz="2000" dirty="0"/>
               <a:t>就会自动替换成</a:t>
             </a:r>
             <a:r>
-              <a:rPr lang="en-US" altLang="zh-CN" sz="2400" dirty="0"/>
+              <a:rPr lang="en-US" altLang="zh-CN" sz="2000" dirty="0"/>
               <a:t>clear</a:t>
             </a:r>
             <a:r>
-              <a:rPr lang="zh-CN" altLang="en-US" sz="2400" dirty="0"/>
+              <a:rPr lang="zh-CN" altLang="en-US" sz="2000" dirty="0"/>
               <a:t>。</a:t>
             </a:r>
-            <a:endParaRPr lang="en-US" altLang="zh-CN" sz="2400" dirty="0"/>
+            <a:endParaRPr lang="en-US" altLang="zh-CN" sz="2000" dirty="0"/>
           </a:p>
           <a:p>
             <a:endParaRPr lang="en-US" altLang="zh-CN" sz="2400" dirty="0"/>

</xml_diff>